<commit_message>
Bổ sung link để tải file dữ liệu trong câu 3 Thêm hướng dẫn cho câu 5 và 6
</commit_message>
<xml_diff>
--- a/huong-dan-thuc-hanh/Ngay01_HuongDanThucHanh_CauHoi3.pptx
+++ b/huong-dan-thuc-hanh/Ngay01_HuongDanThucHanh_CauHoi3.pptx
@@ -5,28 +5,29 @@
     <p:sldMasterId id="2147483708" r:id="rId1"/>
   </p:sldMasterIdLst>
   <p:notesMasterIdLst>
-    <p:notesMasterId r:id="rId13"/>
+    <p:notesMasterId r:id="rId14"/>
   </p:notesMasterIdLst>
   <p:handoutMasterIdLst>
-    <p:handoutMasterId r:id="rId14"/>
+    <p:handoutMasterId r:id="rId15"/>
   </p:handoutMasterIdLst>
   <p:sldIdLst>
     <p:sldId id="256" r:id="rId2"/>
     <p:sldId id="259" r:id="rId3"/>
-    <p:sldId id="260" r:id="rId4"/>
-    <p:sldId id="261" r:id="rId5"/>
-    <p:sldId id="262" r:id="rId6"/>
-    <p:sldId id="263" r:id="rId7"/>
-    <p:sldId id="264" r:id="rId8"/>
-    <p:sldId id="266" r:id="rId9"/>
-    <p:sldId id="267" r:id="rId10"/>
-    <p:sldId id="268" r:id="rId11"/>
-    <p:sldId id="269" r:id="rId12"/>
+    <p:sldId id="270" r:id="rId4"/>
+    <p:sldId id="260" r:id="rId5"/>
+    <p:sldId id="261" r:id="rId6"/>
+    <p:sldId id="262" r:id="rId7"/>
+    <p:sldId id="263" r:id="rId8"/>
+    <p:sldId id="264" r:id="rId9"/>
+    <p:sldId id="266" r:id="rId10"/>
+    <p:sldId id="267" r:id="rId11"/>
+    <p:sldId id="268" r:id="rId12"/>
+    <p:sldId id="269" r:id="rId13"/>
   </p:sldIdLst>
   <p:sldSz cx="9144000" cy="6858000" type="screen4x3"/>
   <p:notesSz cx="6858000" cy="9144000"/>
   <p:custDataLst>
-    <p:tags r:id="rId15"/>
+    <p:tags r:id="rId16"/>
   </p:custDataLst>
   <p:defaultTextStyle>
     <a:defPPr>
@@ -4011,6 +4012,38 @@
           <a:chExt cx="0" cy="0"/>
         </a:xfrm>
       </p:grpSpPr>
+      <p:pic>
+        <p:nvPicPr>
+          <p:cNvPr id="7170" name="Picture 2"/>
+          <p:cNvPicPr>
+            <a:picLocks noChangeAspect="1" noChangeArrowheads="1"/>
+          </p:cNvPicPr>
+          <p:nvPr/>
+        </p:nvPicPr>
+        <p:blipFill>
+          <a:blip r:embed="rId2" cstate="print"/>
+          <a:srcRect/>
+          <a:stretch>
+            <a:fillRect/>
+          </a:stretch>
+        </p:blipFill>
+        <p:spPr bwMode="auto">
+          <a:xfrm>
+            <a:off x="2667000" y="2276475"/>
+            <a:ext cx="3771900" cy="4581525"/>
+          </a:xfrm>
+          <a:prstGeom prst="rect">
+            <a:avLst/>
+          </a:prstGeom>
+          <a:noFill/>
+          <a:ln w="9525">
+            <a:noFill/>
+            <a:miter lim="800000"/>
+            <a:headEnd/>
+            <a:tailEnd/>
+          </a:ln>
+        </p:spPr>
+      </p:pic>
       <p:sp>
         <p:nvSpPr>
           <p:cNvPr id="2" name="Title 1"/>
@@ -4023,12 +4056,37 @@
         </p:nvSpPr>
         <p:spPr/>
         <p:txBody>
+          <a:bodyPr>
+            <a:noAutofit/>
+          </a:bodyPr>
+          <a:lstStyle/>
+          <a:p>
+            <a:r>
+              <a:rPr lang="en-US" sz="3200" b="1" smtClean="0"/>
+              <a:t>Cấu hình Windows Explorer để hiện thị tên file đầy đủ</a:t>
+            </a:r>
+            <a:endParaRPr lang="en-US" sz="3200" b="1"/>
+          </a:p>
+        </p:txBody>
+      </p:sp>
+      <p:sp>
+        <p:nvSpPr>
+          <p:cNvPr id="3" name="Content Placeholder 2"/>
+          <p:cNvSpPr>
+            <a:spLocks noGrp="1"/>
+          </p:cNvSpPr>
+          <p:nvPr>
+            <p:ph idx="1"/>
+          </p:nvPr>
+        </p:nvSpPr>
+        <p:spPr/>
+        <p:txBody>
           <a:bodyPr/>
           <a:lstStyle/>
           <a:p>
             <a:r>
               <a:rPr lang="en-US" smtClean="0"/>
-              <a:t>Đọc dữ liệu</a:t>
+              <a:t>Trong tab View, bỏ chọn “Hide extensions for known file types. Sau đó nhấn nút “OK” để hoàn tất.</a:t>
             </a:r>
             <a:endParaRPr lang="en-US"/>
           </a:p>
@@ -4060,122 +4118,79 @@
       </p:sp>
       <p:sp>
         <p:nvSpPr>
-          <p:cNvPr id="5" name="Content Placeholder 2"/>
-          <p:cNvSpPr>
-            <a:spLocks noGrp="1"/>
-          </p:cNvSpPr>
-          <p:nvPr>
-            <p:ph idx="1"/>
-          </p:nvPr>
+          <p:cNvPr id="6" name="Rectangle 5"/>
+          <p:cNvSpPr/>
+          <p:nvPr/>
         </p:nvSpPr>
         <p:spPr>
           <a:xfrm>
-            <a:off x="457200" y="1066800"/>
-            <a:ext cx="8229600" cy="5791200"/>
+            <a:off x="3200400" y="2590800"/>
+            <a:ext cx="533400" cy="304800"/>
           </a:xfrm>
+          <a:prstGeom prst="rect">
+            <a:avLst/>
+          </a:prstGeom>
+          <a:noFill/>
         </p:spPr>
-        <p:txBody>
-          <a:bodyPr>
-            <a:normAutofit/>
-          </a:bodyPr>
-          <a:lstStyle/>
-          <a:p>
-            <a:pPr>
-              <a:buNone/>
-            </a:pPr>
-            <a:r>
-              <a:rPr lang="en-US" smtClean="0">
-                <a:solidFill>
-                  <a:schemeClr val="tx1"/>
-                </a:solidFill>
-              </a:rPr>
-              <a:t>Bước 3: </a:t>
-            </a:r>
-            <a:r>
-              <a:rPr lang="en-US" smtClean="0"/>
-              <a:t>Đọc file CSV vào R:</a:t>
-            </a:r>
-          </a:p>
-          <a:p>
-            <a:r>
-              <a:rPr lang="en-US" smtClean="0"/>
-              <a:t>Dùng 2 lệnh sau để chọn file và đọc vào đối tượng “data”:</a:t>
-            </a:r>
-          </a:p>
-          <a:p>
-            <a:pPr lvl="1">
-              <a:buFont typeface="Arial" pitchFamily="34" charset="0"/>
-              <a:buChar char="&gt;"/>
-            </a:pPr>
-            <a:r>
-              <a:rPr lang="en-US" smtClean="0">
-                <a:solidFill>
-                  <a:schemeClr val="tx1"/>
-                </a:solidFill>
-              </a:rPr>
-              <a:t>f = file.choose()</a:t>
-            </a:r>
-          </a:p>
-          <a:p>
-            <a:pPr lvl="1">
-              <a:buFont typeface="Arial" pitchFamily="34" charset="0"/>
-              <a:buChar char="&gt;"/>
-            </a:pPr>
-            <a:r>
-              <a:rPr lang="en-US" smtClean="0">
-                <a:solidFill>
-                  <a:schemeClr val="tx1"/>
-                </a:solidFill>
-              </a:rPr>
-              <a:t>data = read.csv(f, header = T)</a:t>
-            </a:r>
-          </a:p>
-          <a:p>
-            <a:r>
-              <a:rPr lang="en-US" smtClean="0"/>
-              <a:t>Xem lại tên cột và vài dòng dữ liệu:</a:t>
-            </a:r>
-          </a:p>
-          <a:p>
-            <a:pPr lvl="1">
-              <a:buFont typeface="Arial" pitchFamily="34" charset="0"/>
-              <a:buChar char="&gt;"/>
-            </a:pPr>
-            <a:r>
-              <a:rPr lang="en-US" smtClean="0">
-                <a:solidFill>
-                  <a:schemeClr val="tx1"/>
-                </a:solidFill>
-              </a:rPr>
-              <a:t>head(data)</a:t>
-            </a:r>
-          </a:p>
-          <a:p>
-            <a:r>
-              <a:rPr lang="en-US" smtClean="0"/>
-              <a:t>Xem số dòng và số cột có trong “data”:</a:t>
-            </a:r>
-          </a:p>
-          <a:p>
-            <a:pPr lvl="1">
-              <a:buFont typeface="Arial" pitchFamily="34" charset="0"/>
-              <a:buChar char="&gt;"/>
-            </a:pPr>
-            <a:r>
-              <a:rPr lang="en-US" smtClean="0">
-                <a:solidFill>
-                  <a:schemeClr val="tx1"/>
-                </a:solidFill>
-              </a:rPr>
-              <a:t>dim(data)</a:t>
-            </a:r>
-          </a:p>
-          <a:p>
-            <a:pPr lvl="1">
-              <a:buFont typeface="Arial" pitchFamily="34" charset="0"/>
-              <a:buChar char="&gt;"/>
-            </a:pPr>
-            <a:endParaRPr lang="en-US" smtClean="0"/>
+        <p:style>
+          <a:lnRef idx="2">
+            <a:schemeClr val="accent2"/>
+          </a:lnRef>
+          <a:fillRef idx="1">
+            <a:schemeClr val="lt1"/>
+          </a:fillRef>
+          <a:effectRef idx="0">
+            <a:schemeClr val="accent2"/>
+          </a:effectRef>
+          <a:fontRef idx="minor">
+            <a:schemeClr val="dk1"/>
+          </a:fontRef>
+        </p:style>
+        <p:txBody>
+          <a:bodyPr rtlCol="0" anchor="ctr"/>
+          <a:lstStyle/>
+          <a:p>
+            <a:pPr algn="ctr"/>
+            <a:endParaRPr lang="en-US"/>
+          </a:p>
+        </p:txBody>
+      </p:sp>
+      <p:sp>
+        <p:nvSpPr>
+          <p:cNvPr id="7" name="Rectangle 6"/>
+          <p:cNvSpPr/>
+          <p:nvPr/>
+        </p:nvSpPr>
+        <p:spPr>
+          <a:xfrm>
+            <a:off x="3124200" y="5562600"/>
+            <a:ext cx="2209800" cy="228600"/>
+          </a:xfrm>
+          <a:prstGeom prst="rect">
+            <a:avLst/>
+          </a:prstGeom>
+          <a:noFill/>
+        </p:spPr>
+        <p:style>
+          <a:lnRef idx="2">
+            <a:schemeClr val="accent2"/>
+          </a:lnRef>
+          <a:fillRef idx="1">
+            <a:schemeClr val="lt1"/>
+          </a:fillRef>
+          <a:effectRef idx="0">
+            <a:schemeClr val="accent2"/>
+          </a:effectRef>
+          <a:fontRef idx="minor">
+            <a:schemeClr val="dk1"/>
+          </a:fontRef>
+        </p:style>
+        <p:txBody>
+          <a:bodyPr rtlCol="0" anchor="ctr"/>
+          <a:lstStyle/>
+          <a:p>
+            <a:pPr algn="ctr"/>
+            <a:endParaRPr lang="en-US"/>
           </a:p>
         </p:txBody>
       </p:sp>
@@ -4221,7 +4236,7 @@
           <a:p>
             <a:r>
               <a:rPr lang="en-US" smtClean="0"/>
-              <a:t>Tổng hợp dữ liệu</a:t>
+              <a:t>Đọc dữ liệu</a:t>
             </a:r>
             <a:endParaRPr lang="en-US"/>
           </a:p>
@@ -4269,6 +4284,199 @@
         </p:spPr>
         <p:txBody>
           <a:bodyPr>
+            <a:normAutofit/>
+          </a:bodyPr>
+          <a:lstStyle/>
+          <a:p>
+            <a:pPr>
+              <a:buNone/>
+            </a:pPr>
+            <a:r>
+              <a:rPr lang="en-US" smtClean="0">
+                <a:solidFill>
+                  <a:schemeClr val="tx1"/>
+                </a:solidFill>
+              </a:rPr>
+              <a:t>Bước 3: </a:t>
+            </a:r>
+            <a:r>
+              <a:rPr lang="en-US" smtClean="0"/>
+              <a:t>Đọc file CSV vào R:</a:t>
+            </a:r>
+          </a:p>
+          <a:p>
+            <a:r>
+              <a:rPr lang="en-US" smtClean="0"/>
+              <a:t>Dùng 2 lệnh sau để chọn file và đọc vào đối tượng “data”:</a:t>
+            </a:r>
+          </a:p>
+          <a:p>
+            <a:pPr lvl="1">
+              <a:buFont typeface="Arial" pitchFamily="34" charset="0"/>
+              <a:buChar char="&gt;"/>
+            </a:pPr>
+            <a:r>
+              <a:rPr lang="en-US" smtClean="0">
+                <a:solidFill>
+                  <a:schemeClr val="tx1"/>
+                </a:solidFill>
+              </a:rPr>
+              <a:t>f = file.choose()</a:t>
+            </a:r>
+          </a:p>
+          <a:p>
+            <a:pPr lvl="1">
+              <a:buFont typeface="Arial" pitchFamily="34" charset="0"/>
+              <a:buChar char="&gt;"/>
+            </a:pPr>
+            <a:r>
+              <a:rPr lang="en-US" smtClean="0">
+                <a:solidFill>
+                  <a:schemeClr val="tx1"/>
+                </a:solidFill>
+              </a:rPr>
+              <a:t>data = read.csv(f, header = T)</a:t>
+            </a:r>
+          </a:p>
+          <a:p>
+            <a:r>
+              <a:rPr lang="en-US" smtClean="0"/>
+              <a:t>Xem lại tên cột và vài dòng dữ liệu:</a:t>
+            </a:r>
+          </a:p>
+          <a:p>
+            <a:pPr lvl="1">
+              <a:buFont typeface="Arial" pitchFamily="34" charset="0"/>
+              <a:buChar char="&gt;"/>
+            </a:pPr>
+            <a:r>
+              <a:rPr lang="en-US" smtClean="0">
+                <a:solidFill>
+                  <a:schemeClr val="tx1"/>
+                </a:solidFill>
+              </a:rPr>
+              <a:t>head(data)</a:t>
+            </a:r>
+          </a:p>
+          <a:p>
+            <a:r>
+              <a:rPr lang="en-US" smtClean="0"/>
+              <a:t>Xem số dòng và số cột có trong “data”:</a:t>
+            </a:r>
+          </a:p>
+          <a:p>
+            <a:pPr lvl="1">
+              <a:buFont typeface="Arial" pitchFamily="34" charset="0"/>
+              <a:buChar char="&gt;"/>
+            </a:pPr>
+            <a:r>
+              <a:rPr lang="en-US" smtClean="0">
+                <a:solidFill>
+                  <a:schemeClr val="tx1"/>
+                </a:solidFill>
+              </a:rPr>
+              <a:t>dim(data)</a:t>
+            </a:r>
+          </a:p>
+          <a:p>
+            <a:pPr lvl="1">
+              <a:buFont typeface="Arial" pitchFamily="34" charset="0"/>
+              <a:buChar char="&gt;"/>
+            </a:pPr>
+            <a:endParaRPr lang="en-US" smtClean="0"/>
+          </a:p>
+        </p:txBody>
+      </p:sp>
+    </p:spTree>
+  </p:cSld>
+  <p:clrMapOvr>
+    <a:masterClrMapping/>
+  </p:clrMapOvr>
+</p:sld>
+</file>
+
+<file path=ppt/slides/slide12.xml><?xml version="1.0" encoding="utf-8"?>
+<p:sld xmlns:a="http://schemas.openxmlformats.org/drawingml/2006/main" xmlns:r="http://schemas.openxmlformats.org/officeDocument/2006/relationships" xmlns:p="http://schemas.openxmlformats.org/presentationml/2006/main">
+  <p:cSld>
+    <p:spTree>
+      <p:nvGrpSpPr>
+        <p:cNvPr id="1" name=""/>
+        <p:cNvGrpSpPr/>
+        <p:nvPr/>
+      </p:nvGrpSpPr>
+      <p:grpSpPr>
+        <a:xfrm>
+          <a:off x="0" y="0"/>
+          <a:ext cx="0" cy="0"/>
+          <a:chOff x="0" y="0"/>
+          <a:chExt cx="0" cy="0"/>
+        </a:xfrm>
+      </p:grpSpPr>
+      <p:sp>
+        <p:nvSpPr>
+          <p:cNvPr id="2" name="Title 1"/>
+          <p:cNvSpPr>
+            <a:spLocks noGrp="1"/>
+          </p:cNvSpPr>
+          <p:nvPr>
+            <p:ph type="title"/>
+          </p:nvPr>
+        </p:nvSpPr>
+        <p:spPr/>
+        <p:txBody>
+          <a:bodyPr/>
+          <a:lstStyle/>
+          <a:p>
+            <a:r>
+              <a:rPr lang="en-US" smtClean="0"/>
+              <a:t>Tổng hợp dữ liệu</a:t>
+            </a:r>
+            <a:endParaRPr lang="en-US"/>
+          </a:p>
+        </p:txBody>
+      </p:sp>
+      <p:sp>
+        <p:nvSpPr>
+          <p:cNvPr id="4" name="Slide Number Placeholder 3"/>
+          <p:cNvSpPr>
+            <a:spLocks noGrp="1"/>
+          </p:cNvSpPr>
+          <p:nvPr>
+            <p:ph type="sldNum" sz="quarter" idx="12"/>
+          </p:nvPr>
+        </p:nvSpPr>
+        <p:spPr/>
+        <p:txBody>
+          <a:bodyPr/>
+          <a:lstStyle/>
+          <a:p>
+            <a:fld id="{B6F15528-21DE-4FAA-801E-634DDDAF4B2B}" type="slidenum">
+              <a:rPr lang="en-US" smtClean="0"/>
+              <a:pPr/>
+              <a:t>12</a:t>
+            </a:fld>
+            <a:endParaRPr lang="en-US"/>
+          </a:p>
+        </p:txBody>
+      </p:sp>
+      <p:sp>
+        <p:nvSpPr>
+          <p:cNvPr id="5" name="Content Placeholder 2"/>
+          <p:cNvSpPr>
+            <a:spLocks noGrp="1"/>
+          </p:cNvSpPr>
+          <p:nvPr>
+            <p:ph idx="1"/>
+          </p:nvPr>
+        </p:nvSpPr>
+        <p:spPr>
+          <a:xfrm>
+            <a:off x="457200" y="1066800"/>
+            <a:ext cx="8229600" cy="5791200"/>
+          </a:xfrm>
+        </p:spPr>
+        <p:txBody>
+          <a:bodyPr>
             <a:normAutofit fontScale="85000" lnSpcReduction="10000"/>
           </a:bodyPr>
           <a:lstStyle/>
@@ -4291,11 +4499,7 @@
             </a:r>
             <a:r>
               <a:rPr lang="en-US" dirty="0" err="1" smtClean="0"/>
-              <a:t>bện</a:t>
-            </a:r>
-            <a:r>
-              <a:rPr lang="en-US" dirty="0" err="1" smtClean="0"/>
-              <a:t>h</a:t>
+              <a:t>bệnh</a:t>
             </a:r>
             <a:r>
               <a:rPr lang="en-US" dirty="0" smtClean="0"/>
@@ -4337,15 +4541,7 @@
                   <a:schemeClr val="tx1"/>
                 </a:solidFill>
               </a:rPr>
-              <a:t>= </a:t>
-            </a:r>
-            <a:r>
-              <a:rPr lang="en-US" sz="2400" dirty="0" smtClean="0">
-                <a:solidFill>
-                  <a:schemeClr val="tx1"/>
-                </a:solidFill>
-              </a:rPr>
-              <a:t>dim(table(</a:t>
+              <a:t>= dim(table(</a:t>
             </a:r>
             <a:r>
               <a:rPr lang="en-US" sz="2400" dirty="0" err="1" smtClean="0">
@@ -4628,15 +4824,7 @@
                   <a:schemeClr val="tx1"/>
                 </a:solidFill>
               </a:rPr>
-              <a:t> </a:t>
-            </a:r>
-            <a:r>
-              <a:rPr lang="en-US" sz="2400" dirty="0" smtClean="0">
-                <a:solidFill>
-                  <a:schemeClr val="tx1"/>
-                </a:solidFill>
-              </a:rPr>
-              <a:t>* 100</a:t>
+              <a:t> * 100</a:t>
             </a:r>
             <a:endParaRPr lang="en-US" dirty="0" smtClean="0">
               <a:solidFill>
@@ -5507,6 +5695,119 @@
           <a:p>
             <a:r>
               <a:rPr lang="en-US" smtClean="0"/>
+              <a:t>Tải file “</a:t>
+            </a:r>
+            <a:r>
+              <a:rPr lang="en-US" b="1" smtClean="0"/>
+              <a:t>test </a:t>
+            </a:r>
+            <a:r>
+              <a:rPr lang="en-US" b="1" smtClean="0"/>
+              <a:t>excel </a:t>
+            </a:r>
+            <a:r>
+              <a:rPr lang="en-US" b="1" smtClean="0"/>
+              <a:t>file </a:t>
+            </a:r>
+            <a:r>
+              <a:rPr lang="en-US" b="1" smtClean="0"/>
+              <a:t>2.xls”</a:t>
+            </a:r>
+            <a:endParaRPr lang="en-US"/>
+          </a:p>
+        </p:txBody>
+      </p:sp>
+      <p:sp>
+        <p:nvSpPr>
+          <p:cNvPr id="3" name="Content Placeholder 2"/>
+          <p:cNvSpPr>
+            <a:spLocks noGrp="1"/>
+          </p:cNvSpPr>
+          <p:nvPr>
+            <p:ph idx="1"/>
+          </p:nvPr>
+        </p:nvSpPr>
+        <p:spPr/>
+        <p:txBody>
+          <a:bodyPr/>
+          <a:lstStyle/>
+          <a:p>
+            <a:r>
+              <a:rPr lang="en-US" smtClean="0">
+                <a:hlinkClick r:id="rId2"/>
+              </a:rPr>
+              <a:t>https://github.com/phantichdulieu/phantichdulieukhoahoc/blob/master/huong-dan-thuc-hanh/DataFiles/test%20excel%20file%202.xls</a:t>
+            </a:r>
+            <a:endParaRPr lang="en-US"/>
+          </a:p>
+        </p:txBody>
+      </p:sp>
+      <p:sp>
+        <p:nvSpPr>
+          <p:cNvPr id="4" name="Slide Number Placeholder 3"/>
+          <p:cNvSpPr>
+            <a:spLocks noGrp="1"/>
+          </p:cNvSpPr>
+          <p:nvPr>
+            <p:ph type="sldNum" sz="quarter" idx="12"/>
+          </p:nvPr>
+        </p:nvSpPr>
+        <p:spPr/>
+        <p:txBody>
+          <a:bodyPr/>
+          <a:lstStyle/>
+          <a:p>
+            <a:fld id="{B6F15528-21DE-4FAA-801E-634DDDAF4B2B}" type="slidenum">
+              <a:rPr lang="en-US" smtClean="0"/>
+              <a:pPr/>
+              <a:t>3</a:t>
+            </a:fld>
+            <a:endParaRPr lang="en-US"/>
+          </a:p>
+        </p:txBody>
+      </p:sp>
+    </p:spTree>
+  </p:cSld>
+  <p:clrMapOvr>
+    <a:masterClrMapping/>
+  </p:clrMapOvr>
+</p:sld>
+</file>
+
+<file path=ppt/slides/slide4.xml><?xml version="1.0" encoding="utf-8"?>
+<p:sld xmlns:a="http://schemas.openxmlformats.org/drawingml/2006/main" xmlns:r="http://schemas.openxmlformats.org/officeDocument/2006/relationships" xmlns:p="http://schemas.openxmlformats.org/presentationml/2006/main">
+  <p:cSld>
+    <p:spTree>
+      <p:nvGrpSpPr>
+        <p:cNvPr id="1" name=""/>
+        <p:cNvGrpSpPr/>
+        <p:nvPr/>
+      </p:nvGrpSpPr>
+      <p:grpSpPr>
+        <a:xfrm>
+          <a:off x="0" y="0"/>
+          <a:ext cx="0" cy="0"/>
+          <a:chOff x="0" y="0"/>
+          <a:chExt cx="0" cy="0"/>
+        </a:xfrm>
+      </p:grpSpPr>
+      <p:sp>
+        <p:nvSpPr>
+          <p:cNvPr id="2" name="Title 1"/>
+          <p:cNvSpPr>
+            <a:spLocks noGrp="1"/>
+          </p:cNvSpPr>
+          <p:nvPr>
+            <p:ph type="title"/>
+          </p:nvPr>
+        </p:nvSpPr>
+        <p:spPr/>
+        <p:txBody>
+          <a:bodyPr/>
+          <a:lstStyle/>
+          <a:p>
+            <a:r>
+              <a:rPr lang="en-US" smtClean="0"/>
               <a:t>Hướng dẫn</a:t>
             </a:r>
             <a:endParaRPr lang="en-US"/>
@@ -5624,7 +5925,7 @@
             <a:fld id="{B6F15528-21DE-4FAA-801E-634DDDAF4B2B}" type="slidenum">
               <a:rPr lang="en-US" smtClean="0"/>
               <a:pPr/>
-              <a:t>3</a:t>
+              <a:t>4</a:t>
             </a:fld>
             <a:endParaRPr lang="en-US"/>
           </a:p>
@@ -5670,7 +5971,7 @@
 </p:sld>
 </file>
 
-<file path=ppt/slides/slide4.xml><?xml version="1.0" encoding="utf-8"?>
+<file path=ppt/slides/slide5.xml><?xml version="1.0" encoding="utf-8"?>
 <p:sld xmlns:a="http://schemas.openxmlformats.org/drawingml/2006/main" xmlns:r="http://schemas.openxmlformats.org/officeDocument/2006/relationships" xmlns:p="http://schemas.openxmlformats.org/presentationml/2006/main">
   <p:cSld>
     <p:spTree>
@@ -5779,7 +6080,7 @@
             <a:fld id="{B6F15528-21DE-4FAA-801E-634DDDAF4B2B}" type="slidenum">
               <a:rPr lang="en-US" smtClean="0"/>
               <a:pPr/>
-              <a:t>4</a:t>
+              <a:t>5</a:t>
             </a:fld>
             <a:endParaRPr lang="en-US"/>
           </a:p>
@@ -6055,7 +6356,7 @@
 </p:sld>
 </file>
 
-<file path=ppt/slides/slide5.xml><?xml version="1.0" encoding="utf-8"?>
+<file path=ppt/slides/slide6.xml><?xml version="1.0" encoding="utf-8"?>
 <p:sld xmlns:a="http://schemas.openxmlformats.org/drawingml/2006/main" xmlns:r="http://schemas.openxmlformats.org/officeDocument/2006/relationships" xmlns:p="http://schemas.openxmlformats.org/presentationml/2006/main">
   <p:cSld>
     <p:spTree>
@@ -6156,7 +6457,7 @@
             <a:fld id="{B6F15528-21DE-4FAA-801E-634DDDAF4B2B}" type="slidenum">
               <a:rPr lang="en-US" smtClean="0"/>
               <a:pPr/>
-              <a:t>5</a:t>
+              <a:t>6</a:t>
             </a:fld>
             <a:endParaRPr lang="en-US"/>
           </a:p>
@@ -6209,7 +6510,7 @@
 </p:sld>
 </file>
 
-<file path=ppt/slides/slide6.xml><?xml version="1.0" encoding="utf-8"?>
+<file path=ppt/slides/slide7.xml><?xml version="1.0" encoding="utf-8"?>
 <p:sld xmlns:a="http://schemas.openxmlformats.org/drawingml/2006/main" xmlns:r="http://schemas.openxmlformats.org/officeDocument/2006/relationships" xmlns:p="http://schemas.openxmlformats.org/presentationml/2006/main">
   <p:cSld>
     <p:spTree>
@@ -6292,7 +6593,7 @@
             <a:fld id="{B6F15528-21DE-4FAA-801E-634DDDAF4B2B}" type="slidenum">
               <a:rPr lang="en-US" smtClean="0"/>
               <a:pPr/>
-              <a:t>6</a:t>
+              <a:t>7</a:t>
             </a:fld>
             <a:endParaRPr lang="en-US"/>
           </a:p>
@@ -6338,7 +6639,7 @@
 </p:sld>
 </file>
 
-<file path=ppt/slides/slide7.xml><?xml version="1.0" encoding="utf-8"?>
+<file path=ppt/slides/slide8.xml><?xml version="1.0" encoding="utf-8"?>
 <p:sld xmlns:a="http://schemas.openxmlformats.org/drawingml/2006/main" xmlns:r="http://schemas.openxmlformats.org/officeDocument/2006/relationships" xmlns:p="http://schemas.openxmlformats.org/presentationml/2006/main">
   <p:cSld>
     <p:spTree>
@@ -6396,7 +6697,7 @@
             <a:fld id="{B6F15528-21DE-4FAA-801E-634DDDAF4B2B}" type="slidenum">
               <a:rPr lang="en-US" smtClean="0"/>
               <a:pPr/>
-              <a:t>7</a:t>
+              <a:t>8</a:t>
             </a:fld>
             <a:endParaRPr lang="en-US"/>
           </a:p>
@@ -6860,11 +7161,7 @@
             </a:r>
             <a:r>
               <a:rPr lang="en-US" dirty="0" smtClean="0"/>
-              <a:t> Windows </a:t>
-            </a:r>
-            <a:r>
-              <a:rPr lang="en-US" dirty="0" smtClean="0"/>
-              <a:t>Explorer </a:t>
+              <a:t> Windows Explorer </a:t>
             </a:r>
             <a:r>
               <a:rPr lang="en-US" dirty="0" err="1" smtClean="0"/>
@@ -6872,11 +7169,7 @@
             </a:r>
             <a:r>
               <a:rPr lang="en-US" dirty="0" smtClean="0"/>
-              <a:t> Windows 7:</a:t>
-            </a:r>
-            <a:r>
-              <a:rPr lang="en-US" dirty="0" smtClean="0"/>
-              <a:t>	</a:t>
+              <a:t> Windows 7:	</a:t>
             </a:r>
           </a:p>
         </p:txBody>
@@ -6889,7 +7182,7 @@
 </p:sld>
 </file>
 
-<file path=ppt/slides/slide8.xml><?xml version="1.0" encoding="utf-8"?>
+<file path=ppt/slides/slide9.xml><?xml version="1.0" encoding="utf-8"?>
 <p:sld xmlns:a="http://schemas.openxmlformats.org/drawingml/2006/main" xmlns:r="http://schemas.openxmlformats.org/officeDocument/2006/relationships" xmlns:p="http://schemas.openxmlformats.org/presentationml/2006/main">
   <p:cSld>
     <p:spTree>
@@ -7004,7 +7297,7 @@
             <a:fld id="{B6F15528-21DE-4FAA-801E-634DDDAF4B2B}" type="slidenum">
               <a:rPr lang="en-US" smtClean="0"/>
               <a:pPr/>
-              <a:t>8</a:t>
+              <a:t>9</a:t>
             </a:fld>
             <a:endParaRPr lang="en-US"/>
           </a:p>
@@ -7096,213 +7389,6 @@
 </p:sld>
 </file>
 
-<file path=ppt/slides/slide9.xml><?xml version="1.0" encoding="utf-8"?>
-<p:sld xmlns:a="http://schemas.openxmlformats.org/drawingml/2006/main" xmlns:r="http://schemas.openxmlformats.org/officeDocument/2006/relationships" xmlns:p="http://schemas.openxmlformats.org/presentationml/2006/main">
-  <p:cSld>
-    <p:spTree>
-      <p:nvGrpSpPr>
-        <p:cNvPr id="1" name=""/>
-        <p:cNvGrpSpPr/>
-        <p:nvPr/>
-      </p:nvGrpSpPr>
-      <p:grpSpPr>
-        <a:xfrm>
-          <a:off x="0" y="0"/>
-          <a:ext cx="0" cy="0"/>
-          <a:chOff x="0" y="0"/>
-          <a:chExt cx="0" cy="0"/>
-        </a:xfrm>
-      </p:grpSpPr>
-      <p:pic>
-        <p:nvPicPr>
-          <p:cNvPr id="7170" name="Picture 2"/>
-          <p:cNvPicPr>
-            <a:picLocks noChangeAspect="1" noChangeArrowheads="1"/>
-          </p:cNvPicPr>
-          <p:nvPr/>
-        </p:nvPicPr>
-        <p:blipFill>
-          <a:blip r:embed="rId2" cstate="print"/>
-          <a:srcRect/>
-          <a:stretch>
-            <a:fillRect/>
-          </a:stretch>
-        </p:blipFill>
-        <p:spPr bwMode="auto">
-          <a:xfrm>
-            <a:off x="2667000" y="2276475"/>
-            <a:ext cx="3771900" cy="4581525"/>
-          </a:xfrm>
-          <a:prstGeom prst="rect">
-            <a:avLst/>
-          </a:prstGeom>
-          <a:noFill/>
-          <a:ln w="9525">
-            <a:noFill/>
-            <a:miter lim="800000"/>
-            <a:headEnd/>
-            <a:tailEnd/>
-          </a:ln>
-        </p:spPr>
-      </p:pic>
-      <p:sp>
-        <p:nvSpPr>
-          <p:cNvPr id="2" name="Title 1"/>
-          <p:cNvSpPr>
-            <a:spLocks noGrp="1"/>
-          </p:cNvSpPr>
-          <p:nvPr>
-            <p:ph type="title"/>
-          </p:nvPr>
-        </p:nvSpPr>
-        <p:spPr/>
-        <p:txBody>
-          <a:bodyPr>
-            <a:noAutofit/>
-          </a:bodyPr>
-          <a:lstStyle/>
-          <a:p>
-            <a:r>
-              <a:rPr lang="en-US" sz="3200" b="1" smtClean="0"/>
-              <a:t>Cấu hình Windows Explorer để hiện thị tên file đầy đủ</a:t>
-            </a:r>
-            <a:endParaRPr lang="en-US" sz="3200" b="1"/>
-          </a:p>
-        </p:txBody>
-      </p:sp>
-      <p:sp>
-        <p:nvSpPr>
-          <p:cNvPr id="3" name="Content Placeholder 2"/>
-          <p:cNvSpPr>
-            <a:spLocks noGrp="1"/>
-          </p:cNvSpPr>
-          <p:nvPr>
-            <p:ph idx="1"/>
-          </p:nvPr>
-        </p:nvSpPr>
-        <p:spPr/>
-        <p:txBody>
-          <a:bodyPr/>
-          <a:lstStyle/>
-          <a:p>
-            <a:r>
-              <a:rPr lang="en-US" smtClean="0"/>
-              <a:t>Trong tab View, bỏ chọn “Hide extensions for known file types. Sau đó nhấn nút “OK” để hoàn tất.</a:t>
-            </a:r>
-            <a:endParaRPr lang="en-US"/>
-          </a:p>
-        </p:txBody>
-      </p:sp>
-      <p:sp>
-        <p:nvSpPr>
-          <p:cNvPr id="4" name="Slide Number Placeholder 3"/>
-          <p:cNvSpPr>
-            <a:spLocks noGrp="1"/>
-          </p:cNvSpPr>
-          <p:nvPr>
-            <p:ph type="sldNum" sz="quarter" idx="12"/>
-          </p:nvPr>
-        </p:nvSpPr>
-        <p:spPr/>
-        <p:txBody>
-          <a:bodyPr/>
-          <a:lstStyle/>
-          <a:p>
-            <a:fld id="{B6F15528-21DE-4FAA-801E-634DDDAF4B2B}" type="slidenum">
-              <a:rPr lang="en-US" smtClean="0"/>
-              <a:pPr/>
-              <a:t>9</a:t>
-            </a:fld>
-            <a:endParaRPr lang="en-US"/>
-          </a:p>
-        </p:txBody>
-      </p:sp>
-      <p:sp>
-        <p:nvSpPr>
-          <p:cNvPr id="6" name="Rectangle 5"/>
-          <p:cNvSpPr/>
-          <p:nvPr/>
-        </p:nvSpPr>
-        <p:spPr>
-          <a:xfrm>
-            <a:off x="3200400" y="2590800"/>
-            <a:ext cx="533400" cy="304800"/>
-          </a:xfrm>
-          <a:prstGeom prst="rect">
-            <a:avLst/>
-          </a:prstGeom>
-          <a:noFill/>
-        </p:spPr>
-        <p:style>
-          <a:lnRef idx="2">
-            <a:schemeClr val="accent2"/>
-          </a:lnRef>
-          <a:fillRef idx="1">
-            <a:schemeClr val="lt1"/>
-          </a:fillRef>
-          <a:effectRef idx="0">
-            <a:schemeClr val="accent2"/>
-          </a:effectRef>
-          <a:fontRef idx="minor">
-            <a:schemeClr val="dk1"/>
-          </a:fontRef>
-        </p:style>
-        <p:txBody>
-          <a:bodyPr rtlCol="0" anchor="ctr"/>
-          <a:lstStyle/>
-          <a:p>
-            <a:pPr algn="ctr"/>
-            <a:endParaRPr lang="en-US"/>
-          </a:p>
-        </p:txBody>
-      </p:sp>
-      <p:sp>
-        <p:nvSpPr>
-          <p:cNvPr id="7" name="Rectangle 6"/>
-          <p:cNvSpPr/>
-          <p:nvPr/>
-        </p:nvSpPr>
-        <p:spPr>
-          <a:xfrm>
-            <a:off x="3124200" y="5562600"/>
-            <a:ext cx="2209800" cy="228600"/>
-          </a:xfrm>
-          <a:prstGeom prst="rect">
-            <a:avLst/>
-          </a:prstGeom>
-          <a:noFill/>
-        </p:spPr>
-        <p:style>
-          <a:lnRef idx="2">
-            <a:schemeClr val="accent2"/>
-          </a:lnRef>
-          <a:fillRef idx="1">
-            <a:schemeClr val="lt1"/>
-          </a:fillRef>
-          <a:effectRef idx="0">
-            <a:schemeClr val="accent2"/>
-          </a:effectRef>
-          <a:fontRef idx="minor">
-            <a:schemeClr val="dk1"/>
-          </a:fontRef>
-        </p:style>
-        <p:txBody>
-          <a:bodyPr rtlCol="0" anchor="ctr"/>
-          <a:lstStyle/>
-          <a:p>
-            <a:pPr algn="ctr"/>
-            <a:endParaRPr lang="en-US"/>
-          </a:p>
-        </p:txBody>
-      </p:sp>
-    </p:spTree>
-  </p:cSld>
-  <p:clrMapOvr>
-    <a:masterClrMapping/>
-  </p:clrMapOvr>
-</p:sld>
-</file>
-
 <file path=ppt/tags/tag1.xml><?xml version="1.0" encoding="utf-8"?>
 <p:tagLst xmlns:a="http://schemas.openxmlformats.org/drawingml/2006/main" xmlns:r="http://schemas.openxmlformats.org/officeDocument/2006/relationships" xmlns:p="http://schemas.openxmlformats.org/presentationml/2006/main">
   <p:tag name="ISPRING_UUID" val="{A902ED5A-4359-4E5E-A55B-BC42C77658B3}"/>
@@ -7319,7 +7405,7 @@
   <p:tag name="ISPRINGONLINEFOLDERPATH" val="Content List"/>
   <p:tag name="ISPRINGCLOUDFOLDERID" val="0"/>
   <p:tag name="ISPRINGCLOUDFOLDERPATH" val="Repository"/>
-  <p:tag name="ISPRING_RESOURCE_PATHS_HASH" val="c81ca68f9d6c83698145daa9fbf97b0e2478b47"/>
+  <p:tag name="ISPRING_RESOURCE_PATHS_HASH" val="2f8c63b2fc2549e61be49f639eeaf045ae27fc"/>
 </p:tagLst>
 </file>
 

</xml_diff>